<commit_message>
fixed the version to 3.0 in text. It was spoken correctly
</commit_message>
<xml_diff>
--- a/Presentations/PIXm webinar 2021.pptx
+++ b/Presentations/PIXm webinar 2021.pptx
@@ -19860,31 +19860,7 @@
                 <a:cs typeface="Arial"/>
                 <a:sym typeface="Arial"/>
               </a:rPr>
-              <a:t>Significant changes from </a:t>
-            </a:r>
-            <a:r>
-              <a:rPr lang="en-US" sz="3000" b="1" dirty="0" err="1">
-                <a:solidFill>
-                  <a:srgbClr val="5A4099"/>
-                </a:solidFill>
-                <a:latin typeface="Arial"/>
-                <a:ea typeface="Arial"/>
-                <a:cs typeface="Arial"/>
-                <a:sym typeface="Arial"/>
-              </a:rPr>
-              <a:t>PIXm</a:t>
-            </a:r>
-            <a:r>
-              <a:rPr lang="en-US" sz="3000" b="1" dirty="0">
-                <a:solidFill>
-                  <a:srgbClr val="5A4099"/>
-                </a:solidFill>
-                <a:latin typeface="Arial"/>
-                <a:ea typeface="Arial"/>
-                <a:cs typeface="Arial"/>
-                <a:sym typeface="Arial"/>
-              </a:rPr>
-              <a:t>, Rev 2.1</a:t>
+              <a:t>Significant changes from PIXm, Rev 3.0</a:t>
             </a:r>
           </a:p>
         </p:txBody>
@@ -19939,8 +19915,29 @@
                 <a:cs typeface="Arial"/>
                 <a:sym typeface="Arial"/>
               </a:rPr>
-              <a:t>FHIR Implementation Guide instead of PDF - Rev. 2.1</a:t>
+              <a:t>FHIR Implementation Guide instead </a:t>
             </a:r>
+            <a:r>
+              <a:rPr lang="en-GB" sz="2000">
+                <a:solidFill>
+                  <a:srgbClr val="595959"/>
+                </a:solidFill>
+                <a:latin typeface="Arial"/>
+                <a:ea typeface="Arial"/>
+                <a:cs typeface="Arial"/>
+                <a:sym typeface="Arial"/>
+              </a:rPr>
+              <a:t>of PDF</a:t>
+            </a:r>
+            <a:endParaRPr lang="en-GB" sz="2000" dirty="0">
+              <a:solidFill>
+                <a:srgbClr val="595959"/>
+              </a:solidFill>
+              <a:latin typeface="Arial"/>
+              <a:ea typeface="Arial"/>
+              <a:cs typeface="Arial"/>
+              <a:sym typeface="Arial"/>
+            </a:endParaRPr>
           </a:p>
           <a:p>
             <a:pPr marL="457200" lvl="0" indent="-355600" algn="l">

</xml_diff>